<commit_message>
PPTs JAVA Dev Web 27Maio2022 MVC OO
</commit_message>
<xml_diff>
--- a/01 Classes/Aula 01. 1 Desenvolvimento de Software  Java - CGI_Servlets Padrões DAO_MVC.pptx
+++ b/01 Classes/Aula 01. 1 Desenvolvimento de Software  Java - CGI_Servlets Padrões DAO_MVC.pptx
@@ -1153,7 +1153,7 @@
           <a:bodyPr/>
           <a:lstStyle/>
           <a:p>
-            <a:endParaRPr lang="pt-BR" dirty="0"/>
+            <a:endParaRPr lang="pt-BR" b="1" dirty="0"/>
           </a:p>
         </p:txBody>
       </p:sp>
@@ -4291,6 +4291,16 @@
               <a:buNone/>
             </a:pPr>
             <a:r>
+              <a:rPr lang="pt-BR" sz="2400" dirty="0">
+                <a:solidFill>
+                  <a:schemeClr val="tx1"/>
+                </a:solidFill>
+                <a:latin typeface="Times New Roman" panose="02020603050405020304" pitchFamily="18" charset="0"/>
+                <a:cs typeface="Times New Roman" panose="02020603050405020304" pitchFamily="18" charset="0"/>
+              </a:rPr>
+              <a:t>O </a:t>
+            </a:r>
+            <a:r>
               <a:rPr lang="pt-BR" sz="2400" b="1" dirty="0">
                 <a:solidFill>
                   <a:schemeClr val="tx1"/>
@@ -4298,7 +4308,7 @@
                 <a:latin typeface="Times New Roman" panose="02020603050405020304" pitchFamily="18" charset="0"/>
                 <a:cs typeface="Times New Roman" panose="02020603050405020304" pitchFamily="18" charset="0"/>
               </a:rPr>
-              <a:t>Service/DAO</a:t>
+              <a:t>Service/DAO,</a:t>
             </a:r>
             <a:r>
               <a:rPr lang="pt-BR" sz="2400" dirty="0">
@@ -4385,7 +4395,7 @@
                 <a:latin typeface="Times New Roman" panose="02020603050405020304" pitchFamily="18" charset="0"/>
                 <a:cs typeface="Times New Roman" panose="02020603050405020304" pitchFamily="18" charset="0"/>
               </a:rPr>
-              <a:t>atualizam o modelo para atender às solicitações de exibição</a:t>
+              <a:t>atualizam o modelo para atender às solicitações de cliente</a:t>
             </a:r>
             <a:r>
               <a:rPr lang="pt-BR" sz="2400" dirty="0">
@@ -4432,7 +4442,7 @@
                 <a:latin typeface="Times New Roman" panose="02020603050405020304" pitchFamily="18" charset="0"/>
                 <a:cs typeface="Times New Roman" panose="02020603050405020304" pitchFamily="18" charset="0"/>
               </a:rPr>
-              <a:t>Serviços usarão objetos Modelo</a:t>
+              <a:t>Serviços </a:t>
             </a:r>
             <a:r>
               <a:rPr lang="pt-BR" sz="2400" dirty="0">
@@ -4442,7 +4452,7 @@
                 <a:latin typeface="Times New Roman" panose="02020603050405020304" pitchFamily="18" charset="0"/>
                 <a:cs typeface="Times New Roman" panose="02020603050405020304" pitchFamily="18" charset="0"/>
               </a:rPr>
-              <a:t> para atender a solicitações de exibição e persistir os resultados em um </a:t>
+              <a:t>usarão </a:t>
             </a:r>
             <a:r>
               <a:rPr lang="pt-BR" sz="2400" b="1" dirty="0">
@@ -4452,7 +4462,47 @@
                 <a:latin typeface="Times New Roman" panose="02020603050405020304" pitchFamily="18" charset="0"/>
                 <a:cs typeface="Times New Roman" panose="02020603050405020304" pitchFamily="18" charset="0"/>
               </a:rPr>
-              <a:t>banco de dados usando a camada de acesso a dados</a:t>
+              <a:t>objetos Modelo</a:t>
+            </a:r>
+            <a:r>
+              <a:rPr lang="pt-BR" sz="2400" dirty="0">
+                <a:solidFill>
+                  <a:schemeClr val="tx1"/>
+                </a:solidFill>
+                <a:latin typeface="Times New Roman" panose="02020603050405020304" pitchFamily="18" charset="0"/>
+                <a:cs typeface="Times New Roman" panose="02020603050405020304" pitchFamily="18" charset="0"/>
+              </a:rPr>
+              <a:t> para atender a solicitações de cliente e persistir os dados em um </a:t>
+            </a:r>
+            <a:r>
+              <a:rPr lang="pt-BR" sz="2400" b="1" dirty="0">
+                <a:solidFill>
+                  <a:schemeClr val="tx1"/>
+                </a:solidFill>
+                <a:latin typeface="Times New Roman" panose="02020603050405020304" pitchFamily="18" charset="0"/>
+                <a:cs typeface="Times New Roman" panose="02020603050405020304" pitchFamily="18" charset="0"/>
+              </a:rPr>
+              <a:t>banco de dados </a:t>
+            </a:r>
+            <a:r>
+              <a:rPr lang="pt-BR" sz="2400" dirty="0">
+                <a:solidFill>
+                  <a:schemeClr val="tx1"/>
+                </a:solidFill>
+                <a:latin typeface="Times New Roman" panose="02020603050405020304" pitchFamily="18" charset="0"/>
+                <a:cs typeface="Times New Roman" panose="02020603050405020304" pitchFamily="18" charset="0"/>
+              </a:rPr>
+              <a:t>usando a</a:t>
+            </a:r>
+            <a:r>
+              <a:rPr lang="pt-BR" sz="2400" b="1" dirty="0">
+                <a:solidFill>
+                  <a:schemeClr val="tx1"/>
+                </a:solidFill>
+                <a:latin typeface="Times New Roman" panose="02020603050405020304" pitchFamily="18" charset="0"/>
+                <a:cs typeface="Times New Roman" panose="02020603050405020304" pitchFamily="18" charset="0"/>
+              </a:rPr>
+              <a:t> camada de acesso a dados(DAO)</a:t>
             </a:r>
             <a:r>
               <a:rPr lang="pt-BR" sz="2400" dirty="0">
@@ -4587,6 +4637,16 @@
               <a:t>Layer</a:t>
             </a:r>
             <a:r>
+              <a:rPr lang="pt-BR" sz="2400" b="1" dirty="0">
+                <a:solidFill>
+                  <a:srgbClr val="FF0000"/>
+                </a:solidFill>
+                <a:latin typeface="Times New Roman" panose="02020603050405020304" pitchFamily="18" charset="0"/>
+                <a:cs typeface="Times New Roman" panose="02020603050405020304" pitchFamily="18" charset="0"/>
+              </a:rPr>
+              <a:t>:</a:t>
+            </a:r>
+            <a:r>
               <a:rPr lang="pt-BR" sz="2400" dirty="0">
                 <a:solidFill>
                   <a:schemeClr val="tx1"/>
@@ -4701,7 +4761,7 @@
                 <a:latin typeface="Times New Roman" panose="02020603050405020304" pitchFamily="18" charset="0"/>
                 <a:cs typeface="Times New Roman" panose="02020603050405020304" pitchFamily="18" charset="0"/>
               </a:rPr>
-              <a:t> </a:t>
+              <a:t>: </a:t>
             </a:r>
             <a:r>
               <a:rPr lang="pt-BR" sz="2400" dirty="0">
@@ -4771,14 +4831,14 @@
               <a:buNone/>
             </a:pPr>
             <a:r>
-              <a:rPr lang="pt-BR" sz="2400" b="1" dirty="0" err="1">
+              <a:rPr lang="pt-BR" sz="2400" b="1" dirty="0">
                 <a:solidFill>
                   <a:srgbClr val="FF0000"/>
                 </a:solidFill>
                 <a:latin typeface="Times New Roman" panose="02020603050405020304" pitchFamily="18" charset="0"/>
                 <a:cs typeface="Times New Roman" panose="02020603050405020304" pitchFamily="18" charset="0"/>
               </a:rPr>
-              <a:t>DAOs</a:t>
+              <a:t>DAO:</a:t>
             </a:r>
             <a:r>
               <a:rPr lang="pt-BR" sz="2400" dirty="0">
@@ -4788,7 +4848,7 @@
                 <a:latin typeface="Times New Roman" panose="02020603050405020304" pitchFamily="18" charset="0"/>
                 <a:cs typeface="Times New Roman" panose="02020603050405020304" pitchFamily="18" charset="0"/>
               </a:rPr>
-              <a:t>: Data Access </a:t>
+              <a:t> Data Access </a:t>
             </a:r>
             <a:r>
               <a:rPr lang="pt-BR" sz="2400" dirty="0" err="1">
@@ -4893,6 +4953,16 @@
                 <a:cs typeface="Times New Roman" panose="02020603050405020304" pitchFamily="18" charset="0"/>
               </a:rPr>
               <a:t>Entities</a:t>
+            </a:r>
+            <a:r>
+              <a:rPr lang="pt-BR" sz="2400" b="1" dirty="0">
+                <a:solidFill>
+                  <a:srgbClr val="FF0000"/>
+                </a:solidFill>
+                <a:latin typeface="Times New Roman" panose="02020603050405020304" pitchFamily="18" charset="0"/>
+                <a:cs typeface="Times New Roman" panose="02020603050405020304" pitchFamily="18" charset="0"/>
+              </a:rPr>
+              <a:t>:</a:t>
             </a:r>
             <a:r>
               <a:rPr lang="pt-BR" sz="2400" dirty="0">
@@ -5029,6 +5099,16 @@
               <a:buNone/>
             </a:pPr>
             <a:r>
+              <a:rPr lang="pt-BR" sz="2400" b="1" dirty="0">
+                <a:solidFill>
+                  <a:srgbClr val="FF0000"/>
+                </a:solidFill>
+                <a:latin typeface="Times New Roman" panose="02020603050405020304" pitchFamily="18" charset="0"/>
+                <a:cs typeface="Times New Roman" panose="02020603050405020304" pitchFamily="18" charset="0"/>
+              </a:rPr>
+              <a:t>	</a:t>
+            </a:r>
+            <a:r>
               <a:rPr lang="pt-BR" sz="2400" b="1" dirty="0" err="1">
                 <a:solidFill>
                   <a:srgbClr val="FF0000"/>
@@ -5126,6 +5206,16 @@
               <a:buNone/>
             </a:pPr>
             <a:r>
+              <a:rPr lang="pt-BR" sz="2400" dirty="0">
+                <a:solidFill>
+                  <a:schemeClr val="tx1"/>
+                </a:solidFill>
+                <a:latin typeface="Times New Roman" panose="02020603050405020304" pitchFamily="18" charset="0"/>
+                <a:cs typeface="Times New Roman" panose="02020603050405020304" pitchFamily="18" charset="0"/>
+              </a:rPr>
+              <a:t>A camada, </a:t>
+            </a:r>
+            <a:r>
               <a:rPr lang="pt-BR" sz="2400" b="1" dirty="0" err="1">
                 <a:solidFill>
                   <a:schemeClr val="tx1"/>
@@ -5156,6 +5246,16 @@
               <a:t>Controller</a:t>
             </a:r>
             <a:r>
+              <a:rPr lang="pt-BR" sz="2400" b="1" dirty="0">
+                <a:solidFill>
+                  <a:schemeClr val="tx1"/>
+                </a:solidFill>
+                <a:latin typeface="Times New Roman" panose="02020603050405020304" pitchFamily="18" charset="0"/>
+                <a:cs typeface="Times New Roman" panose="02020603050405020304" pitchFamily="18" charset="0"/>
+              </a:rPr>
+              <a:t>,</a:t>
+            </a:r>
+            <a:r>
               <a:rPr lang="pt-BR" sz="2400" dirty="0">
                 <a:solidFill>
                   <a:schemeClr val="tx1"/>
@@ -5163,7 +5263,7 @@
                 <a:latin typeface="Times New Roman" panose="02020603050405020304" pitchFamily="18" charset="0"/>
                 <a:cs typeface="Times New Roman" panose="02020603050405020304" pitchFamily="18" charset="0"/>
               </a:rPr>
-              <a:t> são fortemente integrados. Eles serão implementados para a </a:t>
+              <a:t> são fortemente integradas. Elas são implementadas para a </a:t>
             </a:r>
             <a:r>
               <a:rPr lang="pt-BR" sz="2400" b="1" dirty="0">
@@ -5173,7 +5273,7 @@
                 <a:latin typeface="Times New Roman" panose="02020603050405020304" pitchFamily="18" charset="0"/>
                 <a:cs typeface="Times New Roman" panose="02020603050405020304" pitchFamily="18" charset="0"/>
               </a:rPr>
-              <a:t>comunicação entre o cliente </a:t>
+              <a:t>comunicação entre os clientes </a:t>
             </a:r>
             <a:r>
               <a:rPr lang="pt-BR" sz="2400" b="1" dirty="0">
@@ -5230,7 +5330,7 @@
                 <a:latin typeface="Times New Roman" panose="02020603050405020304" pitchFamily="18" charset="0"/>
                 <a:cs typeface="Times New Roman" panose="02020603050405020304" pitchFamily="18" charset="0"/>
               </a:rPr>
-              <a:t>Model (</a:t>
+              <a:t>1. Model: </a:t>
             </a:r>
             <a:r>
               <a:rPr lang="pt-BR" sz="2400" b="1" dirty="0">
@@ -5240,24 +5340,31 @@
                 <a:latin typeface="Times New Roman" panose="02020603050405020304" pitchFamily="18" charset="0"/>
                 <a:cs typeface="Times New Roman" panose="02020603050405020304" pitchFamily="18" charset="0"/>
               </a:rPr>
-              <a:t>Regras de negócio; Entidades; Camada de Acesso a Dados</a:t>
-            </a:r>
-            <a:r>
-              <a:rPr lang="pt-BR" sz="2400" b="1" dirty="0">
-                <a:solidFill>
-                  <a:schemeClr val="tx1"/>
-                </a:solidFill>
-                <a:latin typeface="Times New Roman" panose="02020603050405020304" pitchFamily="18" charset="0"/>
-                <a:cs typeface="Times New Roman" panose="02020603050405020304" pitchFamily="18" charset="0"/>
-              </a:rPr>
-              <a:t>)</a:t>
-            </a:r>
+              <a:t>Regras de negócio; Entidades; DAO</a:t>
+            </a:r>
+            <a:endParaRPr lang="pt-BR" sz="2400" b="1" dirty="0">
+              <a:solidFill>
+                <a:schemeClr val="tx1"/>
+              </a:solidFill>
+              <a:latin typeface="Times New Roman" panose="02020603050405020304" pitchFamily="18" charset="0"/>
+              <a:cs typeface="Times New Roman" panose="02020603050405020304" pitchFamily="18" charset="0"/>
+            </a:endParaRPr>
           </a:p>
           <a:p>
             <a:pPr marL="0" indent="0" algn="just">
               <a:buNone/>
             </a:pPr>
             <a:r>
+              <a:rPr lang="pt-BR" sz="2400" b="1" dirty="0">
+                <a:solidFill>
+                  <a:schemeClr val="tx1"/>
+                </a:solidFill>
+                <a:latin typeface="Times New Roman" panose="02020603050405020304" pitchFamily="18" charset="0"/>
+                <a:cs typeface="Times New Roman" panose="02020603050405020304" pitchFamily="18" charset="0"/>
+              </a:rPr>
+              <a:t>2. </a:t>
+            </a:r>
+            <a:r>
               <a:rPr lang="pt-BR" sz="2400" b="1" dirty="0" err="1">
                 <a:solidFill>
                   <a:schemeClr val="tx1"/>
@@ -5275,7 +5382,7 @@
                 <a:latin typeface="Times New Roman" panose="02020603050405020304" pitchFamily="18" charset="0"/>
                 <a:cs typeface="Times New Roman" panose="02020603050405020304" pitchFamily="18" charset="0"/>
               </a:rPr>
-              <a:t> (</a:t>
+              <a:t>: </a:t>
             </a:r>
             <a:r>
               <a:rPr lang="pt-BR" sz="2400" b="1" dirty="0">
@@ -5297,22 +5404,29 @@
               </a:rPr>
               <a:t>Bootstrap</a:t>
             </a:r>
-            <a:r>
-              <a:rPr lang="pt-BR" sz="2400" b="1" dirty="0">
-                <a:solidFill>
-                  <a:schemeClr val="tx1"/>
-                </a:solidFill>
-                <a:latin typeface="Times New Roman" panose="02020603050405020304" pitchFamily="18" charset="0"/>
-                <a:cs typeface="Times New Roman" panose="02020603050405020304" pitchFamily="18" charset="0"/>
-              </a:rPr>
-              <a:t>)</a:t>
-            </a:r>
+            <a:endParaRPr lang="pt-BR" sz="2400" b="1" dirty="0">
+              <a:solidFill>
+                <a:schemeClr val="tx1"/>
+              </a:solidFill>
+              <a:latin typeface="Times New Roman" panose="02020603050405020304" pitchFamily="18" charset="0"/>
+              <a:cs typeface="Times New Roman" panose="02020603050405020304" pitchFamily="18" charset="0"/>
+            </a:endParaRPr>
           </a:p>
           <a:p>
             <a:pPr marL="0" indent="0" algn="just">
               <a:buNone/>
             </a:pPr>
             <a:r>
+              <a:rPr lang="pt-BR" sz="2400" b="1" dirty="0">
+                <a:solidFill>
+                  <a:schemeClr val="tx1"/>
+                </a:solidFill>
+                <a:latin typeface="Times New Roman" panose="02020603050405020304" pitchFamily="18" charset="0"/>
+                <a:cs typeface="Times New Roman" panose="02020603050405020304" pitchFamily="18" charset="0"/>
+              </a:rPr>
+              <a:t>3. </a:t>
+            </a:r>
+            <a:r>
               <a:rPr lang="pt-BR" sz="2400" b="1" dirty="0" err="1">
                 <a:solidFill>
                   <a:schemeClr val="tx1"/>
@@ -5330,7 +5444,7 @@
                 <a:latin typeface="Times New Roman" panose="02020603050405020304" pitchFamily="18" charset="0"/>
                 <a:cs typeface="Times New Roman" panose="02020603050405020304" pitchFamily="18" charset="0"/>
               </a:rPr>
-              <a:t>(</a:t>
+              <a:t>: </a:t>
             </a:r>
             <a:r>
               <a:rPr lang="pt-BR" sz="2400" b="1" dirty="0">
@@ -5342,16 +5456,13 @@
               </a:rPr>
               <a:t>Fluxo da Aplicação</a:t>
             </a:r>
-            <a:r>
-              <a:rPr lang="pt-BR" sz="2400" b="1" dirty="0">
-                <a:solidFill>
-                  <a:schemeClr val="tx1"/>
-                </a:solidFill>
-                <a:latin typeface="Times New Roman" panose="02020603050405020304" pitchFamily="18" charset="0"/>
-                <a:cs typeface="Times New Roman" panose="02020603050405020304" pitchFamily="18" charset="0"/>
-              </a:rPr>
-              <a:t>)</a:t>
-            </a:r>
+            <a:endParaRPr lang="pt-BR" sz="2400" b="1" dirty="0">
+              <a:solidFill>
+                <a:schemeClr val="tx1"/>
+              </a:solidFill>
+              <a:latin typeface="Times New Roman" panose="02020603050405020304" pitchFamily="18" charset="0"/>
+              <a:cs typeface="Times New Roman" panose="02020603050405020304" pitchFamily="18" charset="0"/>
+            </a:endParaRPr>
           </a:p>
         </p:txBody>
       </p:sp>
@@ -8831,9 +8942,86 @@
               <a:buNone/>
             </a:pPr>
             <a:r>
+              <a:rPr lang="pt-BR" sz="2400" dirty="0">
+                <a:solidFill>
+                  <a:schemeClr val="tx1"/>
+                </a:solidFill>
+                <a:latin typeface="Times New Roman" panose="02020603050405020304" pitchFamily="18" charset="0"/>
+                <a:cs typeface="Times New Roman" panose="02020603050405020304" pitchFamily="18" charset="0"/>
+              </a:rPr>
+              <a:t>São </a:t>
+            </a:r>
+            <a:r>
               <a:rPr lang="pt-BR" sz="2400" b="1" dirty="0">
                 <a:solidFill>
-                  <a:schemeClr val="tx1"/>
+                  <a:srgbClr val="FF0000"/>
+                </a:solidFill>
+                <a:latin typeface="Times New Roman" panose="02020603050405020304" pitchFamily="18" charset="0"/>
+                <a:cs typeface="Times New Roman" panose="02020603050405020304" pitchFamily="18" charset="0"/>
+              </a:rPr>
+              <a:t>componentes</a:t>
+            </a:r>
+            <a:r>
+              <a:rPr lang="pt-BR" sz="2400" dirty="0">
+                <a:solidFill>
+                  <a:schemeClr val="tx1"/>
+                </a:solidFill>
+                <a:latin typeface="Times New Roman" panose="02020603050405020304" pitchFamily="18" charset="0"/>
+                <a:cs typeface="Times New Roman" panose="02020603050405020304" pitchFamily="18" charset="0"/>
+              </a:rPr>
+              <a:t> que integram a </a:t>
+            </a:r>
+            <a:r>
+              <a:rPr lang="pt-BR" sz="2400" b="1" dirty="0">
+                <a:solidFill>
+                  <a:schemeClr val="tx1"/>
+                </a:solidFill>
+                <a:latin typeface="Times New Roman" panose="02020603050405020304" pitchFamily="18" charset="0"/>
+                <a:cs typeface="Times New Roman" panose="02020603050405020304" pitchFamily="18" charset="0"/>
+              </a:rPr>
+              <a:t>arquitetura de software</a:t>
+            </a:r>
+            <a:r>
+              <a:rPr lang="pt-BR" sz="2400" dirty="0">
+                <a:solidFill>
+                  <a:schemeClr val="tx1"/>
+                </a:solidFill>
+                <a:latin typeface="Times New Roman" panose="02020603050405020304" pitchFamily="18" charset="0"/>
+                <a:cs typeface="Times New Roman" panose="02020603050405020304" pitchFamily="18" charset="0"/>
+              </a:rPr>
+              <a:t>.</a:t>
+            </a:r>
+          </a:p>
+          <a:p>
+            <a:pPr marL="0" indent="0" algn="just">
+              <a:buNone/>
+            </a:pPr>
+            <a:endParaRPr lang="pt-BR" sz="2400" b="1" dirty="0">
+              <a:solidFill>
+                <a:schemeClr val="tx1"/>
+              </a:solidFill>
+              <a:latin typeface="Times New Roman" panose="02020603050405020304" pitchFamily="18" charset="0"/>
+              <a:cs typeface="Times New Roman" panose="02020603050405020304" pitchFamily="18" charset="0"/>
+            </a:endParaRPr>
+          </a:p>
+          <a:p>
+            <a:pPr marL="0" indent="0" algn="just">
+              <a:buNone/>
+            </a:pPr>
+            <a:r>
+              <a:rPr lang="pt-BR" sz="2400" b="1" dirty="0">
+                <a:solidFill>
+                  <a:schemeClr val="tx1"/>
+                </a:solidFill>
+                <a:latin typeface="Times New Roman" panose="02020603050405020304" pitchFamily="18" charset="0"/>
+                <a:cs typeface="Times New Roman" panose="02020603050405020304" pitchFamily="18" charset="0"/>
+              </a:rPr>
+              <a:t>Os </a:t>
+            </a:r>
+            <a:r>
+              <a:rPr lang="pt-BR" sz="2400" b="1" dirty="0">
+                <a:solidFill>
+                  <a:srgbClr val="FF0000"/>
                 </a:solidFill>
                 <a:latin typeface="Times New Roman" panose="02020603050405020304" pitchFamily="18" charset="0"/>
                 <a:cs typeface="Times New Roman" panose="02020603050405020304" pitchFamily="18" charset="0"/>
@@ -8848,27 +9036,67 @@
                 <a:latin typeface="Times New Roman" panose="02020603050405020304" pitchFamily="18" charset="0"/>
                 <a:cs typeface="Times New Roman" panose="02020603050405020304" pitchFamily="18" charset="0"/>
               </a:rPr>
-              <a:t> e </a:t>
-            </a:r>
-            <a:r>
-              <a:rPr lang="pt-BR" sz="2400" b="1" dirty="0" err="1">
-                <a:solidFill>
-                  <a:schemeClr val="tx1"/>
-                </a:solidFill>
-                <a:latin typeface="Times New Roman" panose="02020603050405020304" pitchFamily="18" charset="0"/>
-                <a:cs typeface="Times New Roman" panose="02020603050405020304" pitchFamily="18" charset="0"/>
-              </a:rPr>
-              <a:t>DAOs</a:t>
+              <a:t> e os </a:t>
+            </a:r>
+            <a:r>
+              <a:rPr lang="pt-BR" sz="2400" b="1" dirty="0">
+                <a:solidFill>
+                  <a:srgbClr val="FF0000"/>
+                </a:solidFill>
+                <a:latin typeface="Times New Roman" panose="02020603050405020304" pitchFamily="18" charset="0"/>
+                <a:cs typeface="Times New Roman" panose="02020603050405020304" pitchFamily="18" charset="0"/>
+              </a:rPr>
+              <a:t>métodos de acesso</a:t>
             </a:r>
             <a:r>
               <a:rPr lang="pt-BR" sz="2400" dirty="0">
                 <a:solidFill>
-                  <a:schemeClr val="tx1"/>
-                </a:solidFill>
-                <a:latin typeface="Times New Roman" panose="02020603050405020304" pitchFamily="18" charset="0"/>
-                <a:cs typeface="Times New Roman" panose="02020603050405020304" pitchFamily="18" charset="0"/>
-              </a:rPr>
-              <a:t> formam camadas em qualquer aplicativo de n camadas. </a:t>
+                  <a:srgbClr val="FF0000"/>
+                </a:solidFill>
+                <a:latin typeface="Times New Roman" panose="02020603050405020304" pitchFamily="18" charset="0"/>
+                <a:cs typeface="Times New Roman" panose="02020603050405020304" pitchFamily="18" charset="0"/>
+              </a:rPr>
+              <a:t> </a:t>
+            </a:r>
+            <a:r>
+              <a:rPr lang="pt-BR" sz="2400" b="1" dirty="0">
+                <a:solidFill>
+                  <a:srgbClr val="FF0000"/>
+                </a:solidFill>
+                <a:latin typeface="Times New Roman" panose="02020603050405020304" pitchFamily="18" charset="0"/>
+                <a:cs typeface="Times New Roman" panose="02020603050405020304" pitchFamily="18" charset="0"/>
+              </a:rPr>
+              <a:t>DAO,</a:t>
+            </a:r>
+            <a:r>
+              <a:rPr lang="pt-BR" sz="2400" dirty="0">
+                <a:solidFill>
+                  <a:schemeClr val="tx1"/>
+                </a:solidFill>
+                <a:latin typeface="Times New Roman" panose="02020603050405020304" pitchFamily="18" charset="0"/>
+                <a:cs typeface="Times New Roman" panose="02020603050405020304" pitchFamily="18" charset="0"/>
+              </a:rPr>
+              <a:t> formam camadas em qualquer aplicativo de </a:t>
+            </a:r>
+            <a:r>
+              <a:rPr lang="pt-BR" sz="2400" b="1" dirty="0">
+                <a:solidFill>
+                  <a:schemeClr val="tx1"/>
+                </a:solidFill>
+                <a:latin typeface="Times New Roman" panose="02020603050405020304" pitchFamily="18" charset="0"/>
+                <a:cs typeface="Times New Roman" panose="02020603050405020304" pitchFamily="18" charset="0"/>
+              </a:rPr>
+              <a:t>n camadas</a:t>
+            </a:r>
+            <a:r>
+              <a:rPr lang="pt-BR" sz="2400" dirty="0">
+                <a:solidFill>
+                  <a:schemeClr val="tx1"/>
+                </a:solidFill>
+                <a:latin typeface="Times New Roman" panose="02020603050405020304" pitchFamily="18" charset="0"/>
+                <a:cs typeface="Times New Roman" panose="02020603050405020304" pitchFamily="18" charset="0"/>
+              </a:rPr>
+              <a:t>. </a:t>
             </a:r>
           </a:p>
           <a:p>
@@ -8895,7 +9123,7 @@
                 <a:latin typeface="Times New Roman" panose="02020603050405020304" pitchFamily="18" charset="0"/>
                 <a:cs typeface="Times New Roman" panose="02020603050405020304" pitchFamily="18" charset="0"/>
               </a:rPr>
-              <a:t>O aplicativo </a:t>
+              <a:t>O aplicativo com estilo arquitetural padrão </a:t>
             </a:r>
             <a:r>
               <a:rPr lang="pt-BR" sz="2400" b="1" dirty="0">
@@ -8915,27 +9143,17 @@
                 <a:latin typeface="Times New Roman" panose="02020603050405020304" pitchFamily="18" charset="0"/>
                 <a:cs typeface="Times New Roman" panose="02020603050405020304" pitchFamily="18" charset="0"/>
               </a:rPr>
-              <a:t> pode incluir </a:t>
+              <a:t> é composto de </a:t>
             </a:r>
             <a:r>
               <a:rPr lang="pt-BR" sz="2400" b="1" dirty="0">
                 <a:solidFill>
-                  <a:schemeClr val="tx1"/>
-                </a:solidFill>
-                <a:latin typeface="Times New Roman" panose="02020603050405020304" pitchFamily="18" charset="0"/>
-                <a:cs typeface="Times New Roman" panose="02020603050405020304" pitchFamily="18" charset="0"/>
-              </a:rPr>
-              <a:t>Serviços e </a:t>
-            </a:r>
-            <a:r>
-              <a:rPr lang="pt-BR" sz="2400" b="1" dirty="0" err="1">
-                <a:solidFill>
-                  <a:schemeClr val="tx1"/>
-                </a:solidFill>
-                <a:latin typeface="Times New Roman" panose="02020603050405020304" pitchFamily="18" charset="0"/>
-                <a:cs typeface="Times New Roman" panose="02020603050405020304" pitchFamily="18" charset="0"/>
-              </a:rPr>
-              <a:t>DAOs</a:t>
+                  <a:srgbClr val="FF0000"/>
+                </a:solidFill>
+                <a:latin typeface="Times New Roman" panose="02020603050405020304" pitchFamily="18" charset="0"/>
+                <a:cs typeface="Times New Roman" panose="02020603050405020304" pitchFamily="18" charset="0"/>
+              </a:rPr>
+              <a:t>Serviços e DAO</a:t>
             </a:r>
             <a:r>
               <a:rPr lang="pt-BR" sz="2400" dirty="0">
@@ -9077,7 +9295,67 @@
                 <a:latin typeface="Times New Roman" panose="02020603050405020304" pitchFamily="18" charset="0"/>
                 <a:cs typeface="Times New Roman" panose="02020603050405020304" pitchFamily="18" charset="0"/>
               </a:rPr>
-              <a:t>é um termo genérico que basicamente atua como um ponto de entrada para o domínio do aplicativo e normalmente inclui lógica de negócios. </a:t>
+              <a:t>é um termo genérico que basicamente </a:t>
+            </a:r>
+            <a:r>
+              <a:rPr lang="pt-BR" sz="2400" b="1" dirty="0">
+                <a:solidFill>
+                  <a:schemeClr val="tx1"/>
+                </a:solidFill>
+                <a:latin typeface="Times New Roman" panose="02020603050405020304" pitchFamily="18" charset="0"/>
+                <a:cs typeface="Times New Roman" panose="02020603050405020304" pitchFamily="18" charset="0"/>
+              </a:rPr>
+              <a:t>atua</a:t>
+            </a:r>
+            <a:r>
+              <a:rPr lang="pt-BR" sz="2400" dirty="0">
+                <a:solidFill>
+                  <a:schemeClr val="tx1"/>
+                </a:solidFill>
+                <a:latin typeface="Times New Roman" panose="02020603050405020304" pitchFamily="18" charset="0"/>
+                <a:cs typeface="Times New Roman" panose="02020603050405020304" pitchFamily="18" charset="0"/>
+              </a:rPr>
+              <a:t> como um </a:t>
+            </a:r>
+            <a:r>
+              <a:rPr lang="pt-BR" sz="2400" b="1" dirty="0">
+                <a:solidFill>
+                  <a:schemeClr val="tx1"/>
+                </a:solidFill>
+                <a:latin typeface="Times New Roman" panose="02020603050405020304" pitchFamily="18" charset="0"/>
+                <a:cs typeface="Times New Roman" panose="02020603050405020304" pitchFamily="18" charset="0"/>
+              </a:rPr>
+              <a:t>ponto de entrada para o domínio</a:t>
+            </a:r>
+            <a:r>
+              <a:rPr lang="pt-BR" sz="2400" dirty="0">
+                <a:solidFill>
+                  <a:schemeClr val="tx1"/>
+                </a:solidFill>
+                <a:latin typeface="Times New Roman" panose="02020603050405020304" pitchFamily="18" charset="0"/>
+                <a:cs typeface="Times New Roman" panose="02020603050405020304" pitchFamily="18" charset="0"/>
+              </a:rPr>
+              <a:t> do aplicativo e normalmente inclui </a:t>
+            </a:r>
+            <a:r>
+              <a:rPr lang="pt-BR" sz="2400" b="1" dirty="0">
+                <a:solidFill>
+                  <a:srgbClr val="FF0000"/>
+                </a:solidFill>
+                <a:latin typeface="Times New Roman" panose="02020603050405020304" pitchFamily="18" charset="0"/>
+                <a:cs typeface="Times New Roman" panose="02020603050405020304" pitchFamily="18" charset="0"/>
+              </a:rPr>
+              <a:t>lógica de negócios</a:t>
+            </a:r>
+            <a:r>
+              <a:rPr lang="pt-BR" sz="2400" dirty="0">
+                <a:solidFill>
+                  <a:schemeClr val="tx1"/>
+                </a:solidFill>
+                <a:latin typeface="Times New Roman" panose="02020603050405020304" pitchFamily="18" charset="0"/>
+                <a:cs typeface="Times New Roman" panose="02020603050405020304" pitchFamily="18" charset="0"/>
+              </a:rPr>
+              <a:t>. </a:t>
             </a:r>
           </a:p>
           <a:p>
@@ -9104,7 +9382,7 @@
                 <a:latin typeface="Times New Roman" panose="02020603050405020304" pitchFamily="18" charset="0"/>
                 <a:cs typeface="Times New Roman" panose="02020603050405020304" pitchFamily="18" charset="0"/>
               </a:rPr>
-              <a:t>Para um </a:t>
+              <a:t>Um </a:t>
             </a:r>
             <a:r>
               <a:rPr lang="pt-BR" sz="2400" b="1" dirty="0">
@@ -9114,7 +9392,7 @@
                 <a:latin typeface="Times New Roman" panose="02020603050405020304" pitchFamily="18" charset="0"/>
                 <a:cs typeface="Times New Roman" panose="02020603050405020304" pitchFamily="18" charset="0"/>
               </a:rPr>
-              <a:t>aplicativo da Web</a:t>
+              <a:t>aplicativo Web</a:t>
             </a:r>
             <a:r>
               <a:rPr lang="pt-BR" sz="2400" dirty="0">
@@ -9124,7 +9402,7 @@
                 <a:latin typeface="Times New Roman" panose="02020603050405020304" pitchFamily="18" charset="0"/>
                 <a:cs typeface="Times New Roman" panose="02020603050405020304" pitchFamily="18" charset="0"/>
               </a:rPr>
-              <a:t>, você pode tratar a </a:t>
+              <a:t>, sua </a:t>
             </a:r>
             <a:r>
               <a:rPr lang="pt-BR" sz="2400" b="1" dirty="0">
@@ -9144,7 +9422,7 @@
                 <a:latin typeface="Times New Roman" panose="02020603050405020304" pitchFamily="18" charset="0"/>
                 <a:cs typeface="Times New Roman" panose="02020603050405020304" pitchFamily="18" charset="0"/>
               </a:rPr>
-              <a:t> como uma </a:t>
+              <a:t> é tratada como uma </a:t>
             </a:r>
             <a:r>
               <a:rPr lang="pt-BR" sz="2400" b="1" dirty="0">
@@ -9157,6 +9435,16 @@
               <a:t>camada de serviço</a:t>
             </a:r>
             <a:r>
+              <a:rPr lang="pt-BR" sz="2400" b="1" dirty="0">
+                <a:solidFill>
+                  <a:schemeClr val="tx1"/>
+                </a:solidFill>
+                <a:latin typeface="Times New Roman" panose="02020603050405020304" pitchFamily="18" charset="0"/>
+                <a:cs typeface="Times New Roman" panose="02020603050405020304" pitchFamily="18" charset="0"/>
+              </a:rPr>
+              <a:t>, </a:t>
+            </a:r>
+            <a:r>
               <a:rPr lang="pt-BR" sz="2400" dirty="0">
                 <a:solidFill>
                   <a:schemeClr val="tx1"/>
@@ -9164,8 +9452,25 @@
                 <a:latin typeface="Times New Roman" panose="02020603050405020304" pitchFamily="18" charset="0"/>
                 <a:cs typeface="Times New Roman" panose="02020603050405020304" pitchFamily="18" charset="0"/>
               </a:rPr>
-              <a:t> ou, para clientes móveis, pode expor uma API da Web e tratar como uma camada de serviço.</a:t>
-            </a:r>
+              <a:t>assim com, nos app móveis, através da </a:t>
+            </a:r>
+            <a:r>
+              <a:rPr lang="pt-BR" sz="2400" b="1" dirty="0">
+                <a:solidFill>
+                  <a:schemeClr val="tx1"/>
+                </a:solidFill>
+                <a:latin typeface="Times New Roman" panose="02020603050405020304" pitchFamily="18" charset="0"/>
+                <a:cs typeface="Times New Roman" panose="02020603050405020304" pitchFamily="18" charset="0"/>
+              </a:rPr>
+              <a:t>API  REST.</a:t>
+            </a:r>
+            <a:endParaRPr lang="pt-BR" sz="2400" dirty="0">
+              <a:solidFill>
+                <a:schemeClr val="tx1"/>
+              </a:solidFill>
+              <a:latin typeface="Times New Roman" panose="02020603050405020304" pitchFamily="18" charset="0"/>
+              <a:cs typeface="Times New Roman" panose="02020603050405020304" pitchFamily="18" charset="0"/>
+            </a:endParaRPr>
           </a:p>
         </p:txBody>
       </p:sp>
@@ -9259,24 +9564,14 @@
               <a:buNone/>
             </a:pPr>
             <a:r>
-              <a:rPr lang="pt-BR" sz="2400" b="1" dirty="0" err="1">
+              <a:rPr lang="pt-BR" sz="2400" b="1" dirty="0">
                 <a:solidFill>
                   <a:srgbClr val="FF0000"/>
                 </a:solidFill>
                 <a:latin typeface="Times New Roman" panose="02020603050405020304" pitchFamily="18" charset="0"/>
                 <a:cs typeface="Times New Roman" panose="02020603050405020304" pitchFamily="18" charset="0"/>
               </a:rPr>
-              <a:t>DAO</a:t>
-            </a:r>
-            <a:r>
-              <a:rPr lang="pt-BR" sz="2400" dirty="0" err="1">
-                <a:solidFill>
-                  <a:srgbClr val="FF0000"/>
-                </a:solidFill>
-                <a:latin typeface="Times New Roman" panose="02020603050405020304" pitchFamily="18" charset="0"/>
-                <a:cs typeface="Times New Roman" panose="02020603050405020304" pitchFamily="18" charset="0"/>
-              </a:rPr>
-              <a:t>s</a:t>
+              <a:t>A camada DAO</a:t>
             </a:r>
             <a:r>
               <a:rPr lang="pt-BR" sz="2400" dirty="0">
@@ -9286,7 +9581,7 @@
                 <a:latin typeface="Times New Roman" panose="02020603050405020304" pitchFamily="18" charset="0"/>
                 <a:cs typeface="Times New Roman" panose="02020603050405020304" pitchFamily="18" charset="0"/>
               </a:rPr>
-              <a:t> são apenas os </a:t>
+              <a:t> é composta de </a:t>
             </a:r>
             <a:r>
               <a:rPr lang="pt-BR" sz="2400" b="1" dirty="0">
@@ -9346,6 +9641,16 @@
               <a:buNone/>
             </a:pPr>
             <a:r>
+              <a:rPr lang="pt-BR" sz="2400" dirty="0">
+                <a:solidFill>
+                  <a:schemeClr val="tx1"/>
+                </a:solidFill>
+                <a:latin typeface="Times New Roman" panose="02020603050405020304" pitchFamily="18" charset="0"/>
+                <a:cs typeface="Times New Roman" panose="02020603050405020304" pitchFamily="18" charset="0"/>
+              </a:rPr>
+              <a:t>Já o</a:t>
+            </a:r>
+            <a:r>
               <a:rPr lang="pt-BR" sz="2400" b="1" dirty="0">
                 <a:solidFill>
                   <a:srgbClr val="FF0000"/>
@@ -9353,7 +9658,7 @@
                 <a:latin typeface="Times New Roman" panose="02020603050405020304" pitchFamily="18" charset="0"/>
                 <a:cs typeface="Times New Roman" panose="02020603050405020304" pitchFamily="18" charset="0"/>
               </a:rPr>
-              <a:t>MVC</a:t>
+              <a:t> MVC</a:t>
             </a:r>
             <a:r>
               <a:rPr lang="pt-BR" sz="2400" dirty="0">
@@ -9363,7 +9668,7 @@
                 <a:latin typeface="Times New Roman" panose="02020603050405020304" pitchFamily="18" charset="0"/>
                 <a:cs typeface="Times New Roman" panose="02020603050405020304" pitchFamily="18" charset="0"/>
               </a:rPr>
-              <a:t> é um padrão de projeto em que </a:t>
+              <a:t> é um estilo arquitetural, em que </a:t>
             </a:r>
             <a:r>
               <a:rPr lang="pt-BR" sz="2400" b="1" dirty="0">
@@ -9388,7 +9693,7 @@
             <a:r>
               <a:rPr lang="pt-BR" sz="2400" b="1" dirty="0">
                 <a:solidFill>
-                  <a:schemeClr val="tx1"/>
+                  <a:srgbClr val="FF0000"/>
                 </a:solidFill>
                 <a:latin typeface="Times New Roman" panose="02020603050405020304" pitchFamily="18" charset="0"/>
                 <a:cs typeface="Times New Roman" panose="02020603050405020304" pitchFamily="18" charset="0"/>
@@ -9428,7 +9733,7 @@
             <a:r>
               <a:rPr lang="pt-BR" sz="2400" b="1" dirty="0">
                 <a:solidFill>
-                  <a:schemeClr val="tx1"/>
+                  <a:srgbClr val="FF0000"/>
                 </a:solidFill>
                 <a:latin typeface="Times New Roman" panose="02020603050405020304" pitchFamily="18" charset="0"/>
                 <a:cs typeface="Times New Roman" panose="02020603050405020304" pitchFamily="18" charset="0"/>
@@ -9463,6 +9768,16 @@
               <a:buNone/>
             </a:pPr>
             <a:r>
+              <a:rPr lang="pt-BR" sz="2400" dirty="0">
+                <a:solidFill>
+                  <a:schemeClr val="tx1"/>
+                </a:solidFill>
+                <a:latin typeface="Times New Roman" panose="02020603050405020304" pitchFamily="18" charset="0"/>
+                <a:cs typeface="Times New Roman" panose="02020603050405020304" pitchFamily="18" charset="0"/>
+              </a:rPr>
+              <a:t>O </a:t>
+            </a:r>
+            <a:r>
               <a:rPr lang="pt-BR" sz="2400" b="1" dirty="0">
                 <a:solidFill>
                   <a:schemeClr val="tx1"/>
@@ -9470,7 +9785,7 @@
                 <a:latin typeface="Times New Roman" panose="02020603050405020304" pitchFamily="18" charset="0"/>
                 <a:cs typeface="Times New Roman" panose="02020603050405020304" pitchFamily="18" charset="0"/>
               </a:rPr>
-              <a:t>DTO</a:t>
+              <a:t>DTO,</a:t>
             </a:r>
             <a:r>
               <a:rPr lang="pt-BR" sz="2400" dirty="0">
@@ -9520,27 +9835,7 @@
                 <a:latin typeface="Times New Roman" panose="02020603050405020304" pitchFamily="18" charset="0"/>
                 <a:cs typeface="Times New Roman" panose="02020603050405020304" pitchFamily="18" charset="0"/>
               </a:rPr>
-              <a:t>, objeto para transferir dados (</a:t>
-            </a:r>
-            <a:r>
-              <a:rPr lang="pt-BR" sz="2400" b="1" dirty="0">
-                <a:solidFill>
-                  <a:schemeClr val="tx1"/>
-                </a:solidFill>
-                <a:latin typeface="Times New Roman" panose="02020603050405020304" pitchFamily="18" charset="0"/>
-                <a:cs typeface="Times New Roman" panose="02020603050405020304" pitchFamily="18" charset="0"/>
-              </a:rPr>
-              <a:t>JSON</a:t>
-            </a:r>
-            <a:r>
-              <a:rPr lang="pt-BR" sz="2400" dirty="0">
-                <a:solidFill>
-                  <a:schemeClr val="tx1"/>
-                </a:solidFill>
-                <a:latin typeface="Times New Roman" panose="02020603050405020304" pitchFamily="18" charset="0"/>
-                <a:cs typeface="Times New Roman" panose="02020603050405020304" pitchFamily="18" charset="0"/>
-              </a:rPr>
-              <a:t>). </a:t>
+              <a:t>, é um objeto, que serve para manipular e transferir dados. </a:t>
             </a:r>
           </a:p>
         </p:txBody>
@@ -9635,6 +9930,16 @@
               <a:buNone/>
             </a:pPr>
             <a:r>
+              <a:rPr lang="pt-BR" sz="2400" dirty="0">
+                <a:solidFill>
+                  <a:schemeClr val="tx1"/>
+                </a:solidFill>
+                <a:latin typeface="Times New Roman" panose="02020603050405020304" pitchFamily="18" charset="0"/>
+                <a:cs typeface="Times New Roman" panose="02020603050405020304" pitchFamily="18" charset="0"/>
+              </a:rPr>
+              <a:t>O estilo arquitetural, </a:t>
+            </a:r>
+            <a:r>
               <a:rPr lang="pt-BR" sz="2400" b="1" dirty="0">
                 <a:solidFill>
                   <a:schemeClr val="tx1"/>
@@ -9697,7 +10002,7 @@
             <a:r>
               <a:rPr lang="pt-BR" sz="2400" b="1" dirty="0">
                 <a:solidFill>
-                  <a:schemeClr val="tx1"/>
+                  <a:srgbClr val="FF0000"/>
                 </a:solidFill>
                 <a:latin typeface="Times New Roman" panose="02020603050405020304" pitchFamily="18" charset="0"/>
                 <a:cs typeface="Times New Roman" panose="02020603050405020304" pitchFamily="18" charset="0"/>
@@ -9739,7 +10044,7 @@
                 <a:latin typeface="Times New Roman" panose="02020603050405020304" pitchFamily="18" charset="0"/>
                 <a:cs typeface="Times New Roman" panose="02020603050405020304" pitchFamily="18" charset="0"/>
               </a:rPr>
-              <a:t>O </a:t>
+              <a:t>Já o componente </a:t>
             </a:r>
             <a:r>
               <a:rPr lang="pt-BR" sz="2400" b="1" dirty="0" err="1">
@@ -9779,17 +10084,27 @@
                 <a:latin typeface="Times New Roman" panose="02020603050405020304" pitchFamily="18" charset="0"/>
                 <a:cs typeface="Times New Roman" panose="02020603050405020304" pitchFamily="18" charset="0"/>
               </a:rPr>
-              <a:t> (</a:t>
+              <a:t> que aceita </a:t>
             </a:r>
             <a:r>
               <a:rPr lang="pt-BR" sz="2400" b="1" dirty="0">
                 <a:solidFill>
-                  <a:schemeClr val="tx1"/>
-                </a:solidFill>
-                <a:latin typeface="Times New Roman" panose="02020603050405020304" pitchFamily="18" charset="0"/>
-                <a:cs typeface="Times New Roman" panose="02020603050405020304" pitchFamily="18" charset="0"/>
-              </a:rPr>
-              <a:t>para aplicativos da Web</a:t>
+                  <a:srgbClr val="FF0000"/>
+                </a:solidFill>
+                <a:latin typeface="Times New Roman" panose="02020603050405020304" pitchFamily="18" charset="0"/>
+                <a:cs typeface="Times New Roman" panose="02020603050405020304" pitchFamily="18" charset="0"/>
+              </a:rPr>
+              <a:t>solicitações de clientes </a:t>
+            </a:r>
+            <a:r>
+              <a:rPr lang="pt-BR" sz="2400" b="1" dirty="0" err="1">
+                <a:solidFill>
+                  <a:srgbClr val="FF0000"/>
+                </a:solidFill>
+                <a:latin typeface="Times New Roman" panose="02020603050405020304" pitchFamily="18" charset="0"/>
+                <a:cs typeface="Times New Roman" panose="02020603050405020304" pitchFamily="18" charset="0"/>
+              </a:rPr>
+              <a:t>View</a:t>
             </a:r>
             <a:r>
               <a:rPr lang="pt-BR" sz="2400" dirty="0">
@@ -9799,27 +10114,27 @@
                 <a:latin typeface="Times New Roman" panose="02020603050405020304" pitchFamily="18" charset="0"/>
                 <a:cs typeface="Times New Roman" panose="02020603050405020304" pitchFamily="18" charset="0"/>
               </a:rPr>
-              <a:t>) que aceita </a:t>
+              <a:t>, </a:t>
             </a:r>
             <a:r>
               <a:rPr lang="pt-BR" sz="2400" b="1" dirty="0">
                 <a:solidFill>
-                  <a:srgbClr val="00B0F0"/>
-                </a:solidFill>
-                <a:latin typeface="Times New Roman" panose="02020603050405020304" pitchFamily="18" charset="0"/>
-                <a:cs typeface="Times New Roman" panose="02020603050405020304" pitchFamily="18" charset="0"/>
-              </a:rPr>
-              <a:t>solicitações de clientes </a:t>
-            </a:r>
-            <a:r>
-              <a:rPr lang="pt-BR" sz="2400" b="1" dirty="0" err="1">
-                <a:solidFill>
-                  <a:srgbClr val="00B0F0"/>
-                </a:solidFill>
-                <a:latin typeface="Times New Roman" panose="02020603050405020304" pitchFamily="18" charset="0"/>
-                <a:cs typeface="Times New Roman" panose="02020603050405020304" pitchFamily="18" charset="0"/>
-              </a:rPr>
-              <a:t>View</a:t>
+                  <a:schemeClr val="tx1"/>
+                </a:solidFill>
+                <a:latin typeface="Times New Roman" panose="02020603050405020304" pitchFamily="18" charset="0"/>
+                <a:cs typeface="Times New Roman" panose="02020603050405020304" pitchFamily="18" charset="0"/>
+              </a:rPr>
+              <a:t>atualiza o Modelo adequadamente</a:t>
+            </a:r>
+            <a:r>
+              <a:rPr lang="pt-BR" sz="2400" b="1" dirty="0">
+                <a:solidFill>
+                  <a:srgbClr val="00B050"/>
+                </a:solidFill>
+                <a:latin typeface="Times New Roman" panose="02020603050405020304" pitchFamily="18" charset="0"/>
+                <a:cs typeface="Times New Roman" panose="02020603050405020304" pitchFamily="18" charset="0"/>
+              </a:rPr>
+              <a:t> e envia os resultados de volta,</a:t>
             </a:r>
             <a:r>
               <a:rPr lang="pt-BR" sz="2400" dirty="0">
@@ -9829,27 +10144,7 @@
                 <a:latin typeface="Times New Roman" panose="02020603050405020304" pitchFamily="18" charset="0"/>
                 <a:cs typeface="Times New Roman" panose="02020603050405020304" pitchFamily="18" charset="0"/>
               </a:rPr>
-              <a:t>, </a:t>
-            </a:r>
-            <a:r>
-              <a:rPr lang="pt-BR" sz="2400" b="1" dirty="0">
-                <a:solidFill>
-                  <a:srgbClr val="00B050"/>
-                </a:solidFill>
-                <a:latin typeface="Times New Roman" panose="02020603050405020304" pitchFamily="18" charset="0"/>
-                <a:cs typeface="Times New Roman" panose="02020603050405020304" pitchFamily="18" charset="0"/>
-              </a:rPr>
-              <a:t>atualiza o Modelo adequadamente e envia os resultados de volta</a:t>
-            </a:r>
-            <a:r>
-              <a:rPr lang="pt-BR" sz="2400" dirty="0">
-                <a:solidFill>
-                  <a:schemeClr val="tx1"/>
-                </a:solidFill>
-                <a:latin typeface="Times New Roman" panose="02020603050405020304" pitchFamily="18" charset="0"/>
-                <a:cs typeface="Times New Roman" panose="02020603050405020304" pitchFamily="18" charset="0"/>
-              </a:rPr>
-              <a:t> para todos e quaisquer </a:t>
+              <a:t> para os </a:t>
             </a:r>
             <a:r>
               <a:rPr lang="pt-BR" sz="2400" b="1" dirty="0">

</xml_diff>